<commit_message>
Work till 8 Aug
</commit_message>
<xml_diff>
--- a/Documents/Dox/Presentation1.pptx
+++ b/Documents/Dox/Presentation1.pptx
@@ -12,8 +12,8 @@
     <p:sldId id="264" r:id="rId6"/>
     <p:sldId id="265" r:id="rId7"/>
     <p:sldId id="258" r:id="rId8"/>
-    <p:sldId id="259" r:id="rId9"/>
-    <p:sldId id="262" r:id="rId10"/>
+    <p:sldId id="262" r:id="rId9"/>
+    <p:sldId id="259" r:id="rId10"/>
   </p:sldIdLst>
   <p:sldSz cx="12192000" cy="6858000"/>
   <p:notesSz cx="6858000" cy="9144000"/>
@@ -267,7 +267,7 @@
           <a:p>
             <a:fld id="{584E785A-4B92-4669-BA48-10B4A554473E}" type="datetimeFigureOut">
               <a:rPr lang="en-US" smtClean="0"/>
-              <a:t>8/1/2023</a:t>
+              <a:t>8/7/2023</a:t>
             </a:fld>
             <a:endParaRPr lang="en-US"/>
           </a:p>
@@ -465,7 +465,7 @@
           <a:p>
             <a:fld id="{584E785A-4B92-4669-BA48-10B4A554473E}" type="datetimeFigureOut">
               <a:rPr lang="en-US" smtClean="0"/>
-              <a:t>8/1/2023</a:t>
+              <a:t>8/7/2023</a:t>
             </a:fld>
             <a:endParaRPr lang="en-US"/>
           </a:p>
@@ -673,7 +673,7 @@
           <a:p>
             <a:fld id="{584E785A-4B92-4669-BA48-10B4A554473E}" type="datetimeFigureOut">
               <a:rPr lang="en-US" smtClean="0"/>
-              <a:t>8/1/2023</a:t>
+              <a:t>8/7/2023</a:t>
             </a:fld>
             <a:endParaRPr lang="en-US"/>
           </a:p>
@@ -871,7 +871,7 @@
           <a:p>
             <a:fld id="{584E785A-4B92-4669-BA48-10B4A554473E}" type="datetimeFigureOut">
               <a:rPr lang="en-US" smtClean="0"/>
-              <a:t>8/1/2023</a:t>
+              <a:t>8/7/2023</a:t>
             </a:fld>
             <a:endParaRPr lang="en-US"/>
           </a:p>
@@ -1146,7 +1146,7 @@
           <a:p>
             <a:fld id="{584E785A-4B92-4669-BA48-10B4A554473E}" type="datetimeFigureOut">
               <a:rPr lang="en-US" smtClean="0"/>
-              <a:t>8/1/2023</a:t>
+              <a:t>8/7/2023</a:t>
             </a:fld>
             <a:endParaRPr lang="en-US"/>
           </a:p>
@@ -1411,7 +1411,7 @@
           <a:p>
             <a:fld id="{584E785A-4B92-4669-BA48-10B4A554473E}" type="datetimeFigureOut">
               <a:rPr lang="en-US" smtClean="0"/>
-              <a:t>8/1/2023</a:t>
+              <a:t>8/7/2023</a:t>
             </a:fld>
             <a:endParaRPr lang="en-US"/>
           </a:p>
@@ -1823,7 +1823,7 @@
           <a:p>
             <a:fld id="{584E785A-4B92-4669-BA48-10B4A554473E}" type="datetimeFigureOut">
               <a:rPr lang="en-US" smtClean="0"/>
-              <a:t>8/1/2023</a:t>
+              <a:t>8/7/2023</a:t>
             </a:fld>
             <a:endParaRPr lang="en-US"/>
           </a:p>
@@ -1964,7 +1964,7 @@
           <a:p>
             <a:fld id="{584E785A-4B92-4669-BA48-10B4A554473E}" type="datetimeFigureOut">
               <a:rPr lang="en-US" smtClean="0"/>
-              <a:t>8/1/2023</a:t>
+              <a:t>8/7/2023</a:t>
             </a:fld>
             <a:endParaRPr lang="en-US"/>
           </a:p>
@@ -2077,7 +2077,7 @@
           <a:p>
             <a:fld id="{584E785A-4B92-4669-BA48-10B4A554473E}" type="datetimeFigureOut">
               <a:rPr lang="en-US" smtClean="0"/>
-              <a:t>8/1/2023</a:t>
+              <a:t>8/7/2023</a:t>
             </a:fld>
             <a:endParaRPr lang="en-US"/>
           </a:p>
@@ -2388,7 +2388,7 @@
           <a:p>
             <a:fld id="{584E785A-4B92-4669-BA48-10B4A554473E}" type="datetimeFigureOut">
               <a:rPr lang="en-US" smtClean="0"/>
-              <a:t>8/1/2023</a:t>
+              <a:t>8/7/2023</a:t>
             </a:fld>
             <a:endParaRPr lang="en-US"/>
           </a:p>
@@ -2676,7 +2676,7 @@
           <a:p>
             <a:fld id="{584E785A-4B92-4669-BA48-10B4A554473E}" type="datetimeFigureOut">
               <a:rPr lang="en-US" smtClean="0"/>
-              <a:t>8/1/2023</a:t>
+              <a:t>8/7/2023</a:t>
             </a:fld>
             <a:endParaRPr lang="en-US"/>
           </a:p>
@@ -2917,7 +2917,7 @@
           <a:p>
             <a:fld id="{584E785A-4B92-4669-BA48-10B4A554473E}" type="datetimeFigureOut">
               <a:rPr lang="en-US" smtClean="0"/>
-              <a:t>8/1/2023</a:t>
+              <a:t>8/7/2023</a:t>
             </a:fld>
             <a:endParaRPr lang="en-US"/>
           </a:p>
@@ -6978,7 +6978,7 @@
         </p:nvSpPr>
         <p:spPr>
           <a:xfrm>
-            <a:off x="838200" y="348347"/>
+            <a:off x="401973" y="250531"/>
             <a:ext cx="10515600" cy="1325563"/>
           </a:xfrm>
         </p:spPr>
@@ -7478,7 +7478,7 @@
           <p:nvPr>
             <p:extLst>
               <p:ext uri="{D42A27DB-BD31-4B8C-83A1-F6EECF244321}">
-                <p14:modId xmlns:p14="http://schemas.microsoft.com/office/powerpoint/2010/main" val="816971610"/>
+                <p14:modId xmlns:p14="http://schemas.microsoft.com/office/powerpoint/2010/main" val="1849737113"/>
               </p:ext>
             </p:extLst>
           </p:nvPr>
@@ -7749,7 +7749,7 @@
                         <a:rPr lang="en-US" spc="0" baseline="0" dirty="0">
                           <a:latin typeface="+mj-lt"/>
                         </a:rPr>
-                        <a:t>-.79</a:t>
+                        <a:t>-0.79</a:t>
                       </a:r>
                       <a:endParaRPr lang="en-US" dirty="0"/>
                     </a:p>
@@ -8062,8 +8062,8 @@
         </p:nvSpPr>
         <p:spPr>
           <a:xfrm>
-            <a:off x="670420" y="3871330"/>
-            <a:ext cx="10683380" cy="369332"/>
+            <a:off x="318083" y="3590039"/>
+            <a:ext cx="10683380" cy="861774"/>
           </a:xfrm>
           <a:prstGeom prst="rect">
             <a:avLst/>
@@ -8077,18 +8077,17 @@
           <a:lstStyle/>
           <a:p>
             <a:r>
-              <a:rPr lang="en-US" sz="1800" dirty="0"/>
+              <a:rPr lang="en-US" sz="2500" dirty="0"/>
               <a:t>Results with recent data(</a:t>
             </a:r>
             <a:r>
-              <a:rPr lang="en-US" sz="1800" dirty="0" err="1"/>
+              <a:rPr lang="en-US" sz="2500" dirty="0" err="1"/>
               <a:t>AvantiCombined_NSR</a:t>
             </a:r>
             <a:r>
-              <a:rPr lang="en-US" sz="1800" dirty="0"/>
+              <a:rPr lang="en-US" sz="2500" dirty="0"/>
               <a:t>) with Date of Image =  2022-09-12  train and test spilt</a:t>
             </a:r>
-            <a:endParaRPr lang="en-US" dirty="0"/>
           </a:p>
         </p:txBody>
       </p:sp>
@@ -8124,120 +8123,10 @@
       </p:grpSpPr>
       <p:sp>
         <p:nvSpPr>
-          <p:cNvPr id="2" name="Title 1">
-            <a:extLst>
-              <a:ext uri="{FF2B5EF4-FFF2-40B4-BE49-F238E27FC236}">
-                <a16:creationId xmlns:a16="http://schemas.microsoft.com/office/drawing/2014/main" id="{E081BD5C-00EB-0B1E-B9D1-D892761D64AF}"/>
-              </a:ext>
-            </a:extLst>
-          </p:cNvPr>
-          <p:cNvSpPr>
-            <a:spLocks noGrp="1"/>
-          </p:cNvSpPr>
-          <p:nvPr>
-            <p:ph type="title"/>
-          </p:nvPr>
-        </p:nvSpPr>
-        <p:spPr>
-          <a:xfrm>
-            <a:off x="254541" y="-121258"/>
-            <a:ext cx="10515600" cy="1325563"/>
-          </a:xfrm>
-        </p:spPr>
-        <p:txBody>
-          <a:bodyPr/>
-          <a:lstStyle/>
-          <a:p>
-            <a:r>
-              <a:rPr lang="en-US" dirty="0"/>
-              <a:t>WQP estimation using DL and </a:t>
-            </a:r>
-            <a:r>
-              <a:rPr lang="en-US" dirty="0" err="1"/>
-              <a:t>PlanetScope</a:t>
-            </a:r>
-            <a:endParaRPr lang="en-US" dirty="0"/>
-          </a:p>
-        </p:txBody>
-      </p:sp>
-      <p:pic>
-        <p:nvPicPr>
-          <p:cNvPr id="4" name="Picture 3" descr="A screenshot of a computer program&#10;&#10;Description automatically generated">
-            <a:extLst>
-              <a:ext uri="{FF2B5EF4-FFF2-40B4-BE49-F238E27FC236}">
-                <a16:creationId xmlns:a16="http://schemas.microsoft.com/office/drawing/2014/main" id="{C798A160-CE6F-D8DF-8063-142CFA511F86}"/>
-              </a:ext>
-            </a:extLst>
-          </p:cNvPr>
-          <p:cNvPicPr>
-            <a:picLocks noChangeAspect="1"/>
-          </p:cNvPicPr>
-          <p:nvPr/>
-        </p:nvPicPr>
-        <p:blipFill>
-          <a:blip r:embed="rId2">
-            <a:extLst>
-              <a:ext uri="{28A0092B-C50C-407E-A947-70E740481C1C}">
-                <a14:useLocalDpi xmlns:a14="http://schemas.microsoft.com/office/drawing/2010/main" val="0"/>
-              </a:ext>
-            </a:extLst>
-          </a:blip>
-          <a:stretch>
-            <a:fillRect/>
-          </a:stretch>
-        </p:blipFill>
-        <p:spPr>
-          <a:xfrm>
-            <a:off x="5512341" y="2828286"/>
-            <a:ext cx="5403048" cy="4107536"/>
-          </a:xfrm>
-          <a:prstGeom prst="rect">
-            <a:avLst/>
-          </a:prstGeom>
-        </p:spPr>
-      </p:pic>
-      <p:pic>
-        <p:nvPicPr>
-          <p:cNvPr id="6" name="Picture 5" descr="A screenshot of a computer program&#10;&#10;Description automatically generated">
-            <a:extLst>
-              <a:ext uri="{FF2B5EF4-FFF2-40B4-BE49-F238E27FC236}">
-                <a16:creationId xmlns:a16="http://schemas.microsoft.com/office/drawing/2014/main" id="{2FF6E652-8AF4-13DE-59E3-7577EBC23281}"/>
-              </a:ext>
-            </a:extLst>
-          </p:cNvPr>
-          <p:cNvPicPr>
-            <a:picLocks noChangeAspect="1"/>
-          </p:cNvPicPr>
-          <p:nvPr/>
-        </p:nvPicPr>
-        <p:blipFill>
-          <a:blip r:embed="rId3">
-            <a:extLst>
-              <a:ext uri="{28A0092B-C50C-407E-A947-70E740481C1C}">
-                <a14:useLocalDpi xmlns:a14="http://schemas.microsoft.com/office/drawing/2010/main" val="0"/>
-              </a:ext>
-            </a:extLst>
-          </a:blip>
-          <a:stretch>
-            <a:fillRect/>
-          </a:stretch>
-        </p:blipFill>
-        <p:spPr>
-          <a:xfrm>
-            <a:off x="80186" y="1158587"/>
-            <a:ext cx="4732430" cy="5699414"/>
-          </a:xfrm>
-          <a:prstGeom prst="rect">
-            <a:avLst/>
-          </a:prstGeom>
-        </p:spPr>
-      </p:pic>
-      <p:sp>
-        <p:nvSpPr>
-          <p:cNvPr id="7" name="TextBox 6">
-            <a:extLst>
-              <a:ext uri="{FF2B5EF4-FFF2-40B4-BE49-F238E27FC236}">
-                <a16:creationId xmlns:a16="http://schemas.microsoft.com/office/drawing/2014/main" id="{86ABF159-10CC-04D3-86A0-F2DB859B0EB4}"/>
+          <p:cNvPr id="3" name="TextBox 2">
+            <a:extLst>
+              <a:ext uri="{FF2B5EF4-FFF2-40B4-BE49-F238E27FC236}">
+                <a16:creationId xmlns:a16="http://schemas.microsoft.com/office/drawing/2014/main" id="{848125D5-354B-4985-4B4C-C0AA12D54A67}"/>
               </a:ext>
             </a:extLst>
           </p:cNvPr>
@@ -8246,8 +8135,8 @@
         </p:nvSpPr>
         <p:spPr>
           <a:xfrm>
-            <a:off x="5512341" y="848193"/>
-            <a:ext cx="6210853" cy="2031325"/>
+            <a:off x="1333850" y="1107347"/>
+            <a:ext cx="9387281" cy="3139321"/>
           </a:xfrm>
           <a:prstGeom prst="rect">
             <a:avLst/>
@@ -8260,96 +8149,124 @@
           </a:bodyPr>
           <a:lstStyle/>
           <a:p>
-            <a:r>
-              <a:rPr lang="en-US" dirty="0">
-                <a:latin typeface="+mj-lt"/>
-              </a:rPr>
-              <a:t>Very basic model(No HP-tunning) with 50    epochs</a:t>
-            </a:r>
-          </a:p>
-          <a:p>
-            <a:r>
-              <a:rPr lang="en-US" dirty="0">
-                <a:latin typeface="+mj-lt"/>
-              </a:rPr>
-              <a:t>PH = </a:t>
-            </a:r>
-            <a:r>
-              <a:rPr lang="pt-BR" b="0" i="0" dirty="0">
-                <a:effectLst/>
-                <a:latin typeface="+mj-lt"/>
-              </a:rPr>
-              <a:t>MAE: 1.248 RMSE: 1.460 R2: -33.124</a:t>
-            </a:r>
-          </a:p>
-          <a:p>
-            <a:r>
-              <a:rPr lang="en-US" dirty="0">
-                <a:latin typeface="+mj-lt"/>
-              </a:rPr>
-              <a:t>Salinity = </a:t>
-            </a:r>
-            <a:r>
-              <a:rPr lang="pt-BR" b="0" i="0" dirty="0">
-                <a:effectLst/>
-                <a:latin typeface="+mj-lt"/>
-              </a:rPr>
-              <a:t>MAE: 2.224 RMSE: 2.557 R2: 0.608</a:t>
-            </a:r>
-          </a:p>
-          <a:p>
-            <a:r>
-              <a:rPr lang="pt-BR" dirty="0">
-                <a:latin typeface="+mj-lt"/>
-              </a:rPr>
-              <a:t>Ammonia = </a:t>
-            </a:r>
-            <a:r>
-              <a:rPr lang="pt-BR" b="0" i="0" dirty="0">
-                <a:effectLst/>
-                <a:latin typeface="+mj-lt"/>
-              </a:rPr>
-              <a:t>MAE: 0.054 RMSE: 0.071 R2: -66.006</a:t>
-            </a:r>
-            <a:endParaRPr lang="en-US" dirty="0">
-              <a:latin typeface="+mj-lt"/>
-            </a:endParaRPr>
-          </a:p>
-          <a:p>
-            <a:r>
-              <a:rPr lang="en-US" dirty="0">
-                <a:latin typeface="+mj-lt"/>
-              </a:rPr>
-              <a:t>Dataset = NDVI with 30    points.  </a:t>
-            </a:r>
-            <a:r>
-              <a:rPr lang="en-US" b="0" dirty="0">
-                <a:effectLst/>
-                <a:latin typeface="+mj-lt"/>
-              </a:rPr>
-              <a:t>2023-07-09 and</a:t>
-            </a:r>
-          </a:p>
-          <a:p>
-            <a:r>
-              <a:rPr lang="en-US" b="0" dirty="0">
-                <a:effectLst/>
-                <a:latin typeface="+mj-lt"/>
-              </a:rPr>
-              <a:t>2023-04-20</a:t>
-            </a:r>
-          </a:p>
-          <a:p>
-            <a:endParaRPr lang="en-US" dirty="0">
-              <a:latin typeface="+mj-lt"/>
-            </a:endParaRPr>
+            <a:pPr marL="285750" indent="-285750">
+              <a:buFont typeface="Arial" panose="020B0604020202020204" pitchFamily="34" charset="0"/>
+              <a:buChar char="•"/>
+            </a:pPr>
+            <a:r>
+              <a:rPr lang="en-US" dirty="0"/>
+              <a:t>We can keep  both model in pipeline to check  for large dataset.</a:t>
+            </a:r>
+          </a:p>
+          <a:p>
+            <a:pPr marL="285750" indent="-285750">
+              <a:buFont typeface="Arial" panose="020B0604020202020204" pitchFamily="34" charset="0"/>
+              <a:buChar char="•"/>
+            </a:pPr>
+            <a:endParaRPr lang="en-US" dirty="0"/>
+          </a:p>
+          <a:p>
+            <a:pPr marL="285750" indent="-285750">
+              <a:buFont typeface="Arial" panose="020B0604020202020204" pitchFamily="34" charset="0"/>
+              <a:buChar char="•"/>
+            </a:pPr>
+            <a:r>
+              <a:rPr lang="en-US" dirty="0"/>
+              <a:t>But I am lean towards on the WQI model because I know what exactly what's happening in the model.</a:t>
+            </a:r>
+          </a:p>
+          <a:p>
+            <a:pPr marL="285750" indent="-285750">
+              <a:buFont typeface="Arial" panose="020B0604020202020204" pitchFamily="34" charset="0"/>
+              <a:buChar char="•"/>
+            </a:pPr>
+            <a:endParaRPr lang="en-US" dirty="0"/>
+          </a:p>
+          <a:p>
+            <a:pPr marL="285750" indent="-285750">
+              <a:buFont typeface="Arial" panose="020B0604020202020204" pitchFamily="34" charset="0"/>
+              <a:buChar char="•"/>
+            </a:pPr>
+            <a:r>
+              <a:rPr lang="en-US" dirty="0"/>
+              <a:t>Addition of fuzzy logic in the model , which is work better complex model with less data points</a:t>
+            </a:r>
+          </a:p>
+          <a:p>
+            <a:pPr marL="285750" indent="-285750">
+              <a:buFont typeface="Arial" panose="020B0604020202020204" pitchFamily="34" charset="0"/>
+              <a:buChar char="•"/>
+            </a:pPr>
+            <a:endParaRPr lang="en-US" dirty="0"/>
+          </a:p>
+          <a:p>
+            <a:pPr marL="285750" indent="-285750">
+              <a:buFont typeface="Arial" panose="020B0604020202020204" pitchFamily="34" charset="0"/>
+              <a:buChar char="•"/>
+            </a:pPr>
+            <a:r>
+              <a:rPr lang="en-US" dirty="0"/>
+              <a:t>Also, we have kind of switch on model to select for which parameter I need more accuracy as per our importance of parameter </a:t>
+            </a:r>
+          </a:p>
+          <a:p>
+            <a:pPr marL="285750" indent="-285750">
+              <a:buFont typeface="Arial" panose="020B0604020202020204" pitchFamily="34" charset="0"/>
+              <a:buChar char="•"/>
+            </a:pPr>
+            <a:endParaRPr lang="en-US" dirty="0"/>
+          </a:p>
+          <a:p>
+            <a:pPr marL="285750" indent="-285750">
+              <a:buFont typeface="Arial" panose="020B0604020202020204" pitchFamily="34" charset="0"/>
+              <a:buChar char="•"/>
+            </a:pPr>
+            <a:r>
+              <a:rPr lang="en-US" dirty="0"/>
+              <a:t>Also, Deep learning model can be explored heavily with planet scope data</a:t>
+            </a:r>
+          </a:p>
+        </p:txBody>
+      </p:sp>
+      <p:sp>
+        <p:nvSpPr>
+          <p:cNvPr id="4" name="TextBox 3">
+            <a:extLst>
+              <a:ext uri="{FF2B5EF4-FFF2-40B4-BE49-F238E27FC236}">
+                <a16:creationId xmlns:a16="http://schemas.microsoft.com/office/drawing/2014/main" id="{C6935184-132B-998A-8C56-B908582C8C8A}"/>
+              </a:ext>
+            </a:extLst>
+          </p:cNvPr>
+          <p:cNvSpPr txBox="1"/>
+          <p:nvPr/>
+        </p:nvSpPr>
+        <p:spPr>
+          <a:xfrm>
+            <a:off x="1006679" y="461394"/>
+            <a:ext cx="5553512" cy="523220"/>
+          </a:xfrm>
+          <a:prstGeom prst="rect">
+            <a:avLst/>
+          </a:prstGeom>
+          <a:noFill/>
+        </p:spPr>
+        <p:txBody>
+          <a:bodyPr wrap="square" rtlCol="0">
+            <a:spAutoFit/>
+          </a:bodyPr>
+          <a:lstStyle/>
+          <a:p>
+            <a:r>
+              <a:rPr lang="en-US" sz="2800" dirty="0"/>
+              <a:t>Observation</a:t>
+            </a:r>
           </a:p>
         </p:txBody>
       </p:sp>
     </p:spTree>
     <p:extLst>
       <p:ext uri="{BB962C8B-B14F-4D97-AF65-F5344CB8AC3E}">
-        <p14:creationId xmlns:p14="http://schemas.microsoft.com/office/powerpoint/2010/main" val="934267909"/>
+        <p14:creationId xmlns:p14="http://schemas.microsoft.com/office/powerpoint/2010/main" val="1383049613"/>
       </p:ext>
     </p:extLst>
   </p:cSld>
@@ -8378,10 +8295,120 @@
       </p:grpSpPr>
       <p:sp>
         <p:nvSpPr>
-          <p:cNvPr id="3" name="TextBox 2">
-            <a:extLst>
-              <a:ext uri="{FF2B5EF4-FFF2-40B4-BE49-F238E27FC236}">
-                <a16:creationId xmlns:a16="http://schemas.microsoft.com/office/drawing/2014/main" id="{848125D5-354B-4985-4B4C-C0AA12D54A67}"/>
+          <p:cNvPr id="2" name="Title 1">
+            <a:extLst>
+              <a:ext uri="{FF2B5EF4-FFF2-40B4-BE49-F238E27FC236}">
+                <a16:creationId xmlns:a16="http://schemas.microsoft.com/office/drawing/2014/main" id="{E081BD5C-00EB-0B1E-B9D1-D892761D64AF}"/>
+              </a:ext>
+            </a:extLst>
+          </p:cNvPr>
+          <p:cNvSpPr>
+            <a:spLocks noGrp="1"/>
+          </p:cNvSpPr>
+          <p:nvPr>
+            <p:ph type="title"/>
+          </p:nvPr>
+        </p:nvSpPr>
+        <p:spPr>
+          <a:xfrm>
+            <a:off x="254541" y="-121258"/>
+            <a:ext cx="10515600" cy="1325563"/>
+          </a:xfrm>
+        </p:spPr>
+        <p:txBody>
+          <a:bodyPr/>
+          <a:lstStyle/>
+          <a:p>
+            <a:r>
+              <a:rPr lang="en-US" dirty="0"/>
+              <a:t>WQP estimation using DL and </a:t>
+            </a:r>
+            <a:r>
+              <a:rPr lang="en-US" dirty="0" err="1"/>
+              <a:t>PlanetScope</a:t>
+            </a:r>
+            <a:endParaRPr lang="en-US" dirty="0"/>
+          </a:p>
+        </p:txBody>
+      </p:sp>
+      <p:pic>
+        <p:nvPicPr>
+          <p:cNvPr id="4" name="Picture 3" descr="A screenshot of a computer program&#10;&#10;Description automatically generated">
+            <a:extLst>
+              <a:ext uri="{FF2B5EF4-FFF2-40B4-BE49-F238E27FC236}">
+                <a16:creationId xmlns:a16="http://schemas.microsoft.com/office/drawing/2014/main" id="{C798A160-CE6F-D8DF-8063-142CFA511F86}"/>
+              </a:ext>
+            </a:extLst>
+          </p:cNvPr>
+          <p:cNvPicPr>
+            <a:picLocks noChangeAspect="1"/>
+          </p:cNvPicPr>
+          <p:nvPr/>
+        </p:nvPicPr>
+        <p:blipFill>
+          <a:blip r:embed="rId2">
+            <a:extLst>
+              <a:ext uri="{28A0092B-C50C-407E-A947-70E740481C1C}">
+                <a14:useLocalDpi xmlns:a14="http://schemas.microsoft.com/office/drawing/2010/main" val="0"/>
+              </a:ext>
+            </a:extLst>
+          </a:blip>
+          <a:stretch>
+            <a:fillRect/>
+          </a:stretch>
+        </p:blipFill>
+        <p:spPr>
+          <a:xfrm>
+            <a:off x="5512341" y="2828286"/>
+            <a:ext cx="5403048" cy="4107536"/>
+          </a:xfrm>
+          <a:prstGeom prst="rect">
+            <a:avLst/>
+          </a:prstGeom>
+        </p:spPr>
+      </p:pic>
+      <p:pic>
+        <p:nvPicPr>
+          <p:cNvPr id="6" name="Picture 5" descr="A screenshot of a computer program&#10;&#10;Description automatically generated">
+            <a:extLst>
+              <a:ext uri="{FF2B5EF4-FFF2-40B4-BE49-F238E27FC236}">
+                <a16:creationId xmlns:a16="http://schemas.microsoft.com/office/drawing/2014/main" id="{2FF6E652-8AF4-13DE-59E3-7577EBC23281}"/>
+              </a:ext>
+            </a:extLst>
+          </p:cNvPr>
+          <p:cNvPicPr>
+            <a:picLocks noChangeAspect="1"/>
+          </p:cNvPicPr>
+          <p:nvPr/>
+        </p:nvPicPr>
+        <p:blipFill>
+          <a:blip r:embed="rId3">
+            <a:extLst>
+              <a:ext uri="{28A0092B-C50C-407E-A947-70E740481C1C}">
+                <a14:useLocalDpi xmlns:a14="http://schemas.microsoft.com/office/drawing/2010/main" val="0"/>
+              </a:ext>
+            </a:extLst>
+          </a:blip>
+          <a:stretch>
+            <a:fillRect/>
+          </a:stretch>
+        </p:blipFill>
+        <p:spPr>
+          <a:xfrm>
+            <a:off x="80186" y="1158587"/>
+            <a:ext cx="4732430" cy="5699414"/>
+          </a:xfrm>
+          <a:prstGeom prst="rect">
+            <a:avLst/>
+          </a:prstGeom>
+        </p:spPr>
+      </p:pic>
+      <p:sp>
+        <p:nvSpPr>
+          <p:cNvPr id="7" name="TextBox 6">
+            <a:extLst>
+              <a:ext uri="{FF2B5EF4-FFF2-40B4-BE49-F238E27FC236}">
+                <a16:creationId xmlns:a16="http://schemas.microsoft.com/office/drawing/2014/main" id="{86ABF159-10CC-04D3-86A0-F2DB859B0EB4}"/>
               </a:ext>
             </a:extLst>
           </p:cNvPr>
@@ -8390,8 +8417,8 @@
         </p:nvSpPr>
         <p:spPr>
           <a:xfrm>
-            <a:off x="1333850" y="1107347"/>
-            <a:ext cx="9387281" cy="3139321"/>
+            <a:off x="5512341" y="848193"/>
+            <a:ext cx="6210853" cy="2031325"/>
           </a:xfrm>
           <a:prstGeom prst="rect">
             <a:avLst/>
@@ -8404,124 +8431,96 @@
           </a:bodyPr>
           <a:lstStyle/>
           <a:p>
-            <a:pPr marL="285750" indent="-285750">
-              <a:buFont typeface="Arial" panose="020B0604020202020204" pitchFamily="34" charset="0"/>
-              <a:buChar char="•"/>
-            </a:pPr>
-            <a:r>
-              <a:rPr lang="en-US" dirty="0"/>
-              <a:t>We can keep  both model in pipeline to check  for large dataset.</a:t>
-            </a:r>
-          </a:p>
-          <a:p>
-            <a:pPr marL="285750" indent="-285750">
-              <a:buFont typeface="Arial" panose="020B0604020202020204" pitchFamily="34" charset="0"/>
-              <a:buChar char="•"/>
-            </a:pPr>
-            <a:endParaRPr lang="en-US" dirty="0"/>
-          </a:p>
-          <a:p>
-            <a:pPr marL="285750" indent="-285750">
-              <a:buFont typeface="Arial" panose="020B0604020202020204" pitchFamily="34" charset="0"/>
-              <a:buChar char="•"/>
-            </a:pPr>
-            <a:r>
-              <a:rPr lang="en-US" dirty="0"/>
-              <a:t>But I am lean towards on the WQI model because I know what exactly what's happening in the model.</a:t>
-            </a:r>
-          </a:p>
-          <a:p>
-            <a:pPr marL="285750" indent="-285750">
-              <a:buFont typeface="Arial" panose="020B0604020202020204" pitchFamily="34" charset="0"/>
-              <a:buChar char="•"/>
-            </a:pPr>
-            <a:endParaRPr lang="en-US" dirty="0"/>
-          </a:p>
-          <a:p>
-            <a:pPr marL="285750" indent="-285750">
-              <a:buFont typeface="Arial" panose="020B0604020202020204" pitchFamily="34" charset="0"/>
-              <a:buChar char="•"/>
-            </a:pPr>
-            <a:r>
-              <a:rPr lang="en-US" dirty="0"/>
-              <a:t>Addition of fuzzy logic in the model , which is work better complex model with less data points</a:t>
-            </a:r>
-          </a:p>
-          <a:p>
-            <a:pPr marL="285750" indent="-285750">
-              <a:buFont typeface="Arial" panose="020B0604020202020204" pitchFamily="34" charset="0"/>
-              <a:buChar char="•"/>
-            </a:pPr>
-            <a:endParaRPr lang="en-US" dirty="0"/>
-          </a:p>
-          <a:p>
-            <a:pPr marL="285750" indent="-285750">
-              <a:buFont typeface="Arial" panose="020B0604020202020204" pitchFamily="34" charset="0"/>
-              <a:buChar char="•"/>
-            </a:pPr>
-            <a:r>
-              <a:rPr lang="en-US" dirty="0"/>
-              <a:t>Also, we have kind of switch on model to select for which parameter I need more accuracy as per our importance of parameter </a:t>
-            </a:r>
-          </a:p>
-          <a:p>
-            <a:pPr marL="285750" indent="-285750">
-              <a:buFont typeface="Arial" panose="020B0604020202020204" pitchFamily="34" charset="0"/>
-              <a:buChar char="•"/>
-            </a:pPr>
-            <a:endParaRPr lang="en-US" dirty="0"/>
-          </a:p>
-          <a:p>
-            <a:pPr marL="285750" indent="-285750">
-              <a:buFont typeface="Arial" panose="020B0604020202020204" pitchFamily="34" charset="0"/>
-              <a:buChar char="•"/>
-            </a:pPr>
-            <a:r>
-              <a:rPr lang="en-US" dirty="0"/>
-              <a:t>Also, Deep learning model can be explored heavily with planet scope data</a:t>
-            </a:r>
-          </a:p>
-        </p:txBody>
-      </p:sp>
-      <p:sp>
-        <p:nvSpPr>
-          <p:cNvPr id="4" name="TextBox 3">
-            <a:extLst>
-              <a:ext uri="{FF2B5EF4-FFF2-40B4-BE49-F238E27FC236}">
-                <a16:creationId xmlns:a16="http://schemas.microsoft.com/office/drawing/2014/main" id="{C6935184-132B-998A-8C56-B908582C8C8A}"/>
-              </a:ext>
-            </a:extLst>
-          </p:cNvPr>
-          <p:cNvSpPr txBox="1"/>
-          <p:nvPr/>
-        </p:nvSpPr>
-        <p:spPr>
-          <a:xfrm>
-            <a:off x="1006679" y="461394"/>
-            <a:ext cx="5553512" cy="523220"/>
-          </a:xfrm>
-          <a:prstGeom prst="rect">
-            <a:avLst/>
-          </a:prstGeom>
-          <a:noFill/>
-        </p:spPr>
-        <p:txBody>
-          <a:bodyPr wrap="square" rtlCol="0">
-            <a:spAutoFit/>
-          </a:bodyPr>
-          <a:lstStyle/>
-          <a:p>
-            <a:r>
-              <a:rPr lang="en-US" sz="2800" dirty="0"/>
-              <a:t>My thoughts</a:t>
-            </a:r>
+            <a:r>
+              <a:rPr lang="en-US" dirty="0">
+                <a:latin typeface="+mj-lt"/>
+              </a:rPr>
+              <a:t>Very basic model(No HP-tunning) with 50    epochs</a:t>
+            </a:r>
+          </a:p>
+          <a:p>
+            <a:r>
+              <a:rPr lang="en-US" dirty="0">
+                <a:latin typeface="+mj-lt"/>
+              </a:rPr>
+              <a:t>PH = </a:t>
+            </a:r>
+            <a:r>
+              <a:rPr lang="pt-BR" b="0" i="0" dirty="0">
+                <a:effectLst/>
+                <a:latin typeface="+mj-lt"/>
+              </a:rPr>
+              <a:t>MAE: 1.248 RMSE: 1.460 R2: -33.124</a:t>
+            </a:r>
+          </a:p>
+          <a:p>
+            <a:r>
+              <a:rPr lang="en-US" dirty="0">
+                <a:latin typeface="+mj-lt"/>
+              </a:rPr>
+              <a:t>Salinity = </a:t>
+            </a:r>
+            <a:r>
+              <a:rPr lang="pt-BR" b="0" i="0" dirty="0">
+                <a:effectLst/>
+                <a:latin typeface="+mj-lt"/>
+              </a:rPr>
+              <a:t>MAE: 2.224 RMSE: 2.557 R2: 0.608</a:t>
+            </a:r>
+          </a:p>
+          <a:p>
+            <a:r>
+              <a:rPr lang="pt-BR" dirty="0">
+                <a:latin typeface="+mj-lt"/>
+              </a:rPr>
+              <a:t>Ammonia = </a:t>
+            </a:r>
+            <a:r>
+              <a:rPr lang="pt-BR" b="0" i="0" dirty="0">
+                <a:effectLst/>
+                <a:latin typeface="+mj-lt"/>
+              </a:rPr>
+              <a:t>MAE: 0.054 RMSE: 0.071 R2: -66.006</a:t>
+            </a:r>
+            <a:endParaRPr lang="en-US" dirty="0">
+              <a:latin typeface="+mj-lt"/>
+            </a:endParaRPr>
+          </a:p>
+          <a:p>
+            <a:r>
+              <a:rPr lang="en-US" dirty="0">
+                <a:latin typeface="+mj-lt"/>
+              </a:rPr>
+              <a:t>Dataset = NDVI with 30    points.  </a:t>
+            </a:r>
+            <a:r>
+              <a:rPr lang="en-US" b="0" dirty="0">
+                <a:effectLst/>
+                <a:latin typeface="+mj-lt"/>
+              </a:rPr>
+              <a:t>2023-07-09 and</a:t>
+            </a:r>
+          </a:p>
+          <a:p>
+            <a:r>
+              <a:rPr lang="en-US" b="0" dirty="0">
+                <a:effectLst/>
+                <a:latin typeface="+mj-lt"/>
+              </a:rPr>
+              <a:t>2023-04-20</a:t>
+            </a:r>
+          </a:p>
+          <a:p>
+            <a:endParaRPr lang="en-US" dirty="0">
+              <a:latin typeface="+mj-lt"/>
+            </a:endParaRPr>
           </a:p>
         </p:txBody>
       </p:sp>
     </p:spTree>
     <p:extLst>
       <p:ext uri="{BB962C8B-B14F-4D97-AF65-F5344CB8AC3E}">
-        <p14:creationId xmlns:p14="http://schemas.microsoft.com/office/powerpoint/2010/main" val="1383049613"/>
+        <p14:creationId xmlns:p14="http://schemas.microsoft.com/office/powerpoint/2010/main" val="934267909"/>
       </p:ext>
     </p:extLst>
   </p:cSld>

</xml_diff>

<commit_message>
incoming changes from dev PR completetion
</commit_message>
<xml_diff>
--- a/Documents/Dox/Presentation1.pptx
+++ b/Documents/Dox/Presentation1.pptx
@@ -14,6 +14,7 @@
     <p:sldId id="258" r:id="rId8"/>
     <p:sldId id="262" r:id="rId9"/>
     <p:sldId id="259" r:id="rId10"/>
+    <p:sldId id="266" r:id="rId11"/>
   </p:sldIdLst>
   <p:sldSz cx="12192000" cy="6858000"/>
   <p:notesSz cx="6858000" cy="9144000"/>
@@ -267,7 +268,7 @@
           <a:p>
             <a:fld id="{584E785A-4B92-4669-BA48-10B4A554473E}" type="datetimeFigureOut">
               <a:rPr lang="en-US" smtClean="0"/>
-              <a:t>8/7/2023</a:t>
+              <a:t>9/22/2023</a:t>
             </a:fld>
             <a:endParaRPr lang="en-US"/>
           </a:p>
@@ -465,7 +466,7 @@
           <a:p>
             <a:fld id="{584E785A-4B92-4669-BA48-10B4A554473E}" type="datetimeFigureOut">
               <a:rPr lang="en-US" smtClean="0"/>
-              <a:t>8/7/2023</a:t>
+              <a:t>9/22/2023</a:t>
             </a:fld>
             <a:endParaRPr lang="en-US"/>
           </a:p>
@@ -673,7 +674,7 @@
           <a:p>
             <a:fld id="{584E785A-4B92-4669-BA48-10B4A554473E}" type="datetimeFigureOut">
               <a:rPr lang="en-US" smtClean="0"/>
-              <a:t>8/7/2023</a:t>
+              <a:t>9/22/2023</a:t>
             </a:fld>
             <a:endParaRPr lang="en-US"/>
           </a:p>
@@ -871,7 +872,7 @@
           <a:p>
             <a:fld id="{584E785A-4B92-4669-BA48-10B4A554473E}" type="datetimeFigureOut">
               <a:rPr lang="en-US" smtClean="0"/>
-              <a:t>8/7/2023</a:t>
+              <a:t>9/22/2023</a:t>
             </a:fld>
             <a:endParaRPr lang="en-US"/>
           </a:p>
@@ -1146,7 +1147,7 @@
           <a:p>
             <a:fld id="{584E785A-4B92-4669-BA48-10B4A554473E}" type="datetimeFigureOut">
               <a:rPr lang="en-US" smtClean="0"/>
-              <a:t>8/7/2023</a:t>
+              <a:t>9/22/2023</a:t>
             </a:fld>
             <a:endParaRPr lang="en-US"/>
           </a:p>
@@ -1411,7 +1412,7 @@
           <a:p>
             <a:fld id="{584E785A-4B92-4669-BA48-10B4A554473E}" type="datetimeFigureOut">
               <a:rPr lang="en-US" smtClean="0"/>
-              <a:t>8/7/2023</a:t>
+              <a:t>9/22/2023</a:t>
             </a:fld>
             <a:endParaRPr lang="en-US"/>
           </a:p>
@@ -1823,7 +1824,7 @@
           <a:p>
             <a:fld id="{584E785A-4B92-4669-BA48-10B4A554473E}" type="datetimeFigureOut">
               <a:rPr lang="en-US" smtClean="0"/>
-              <a:t>8/7/2023</a:t>
+              <a:t>9/22/2023</a:t>
             </a:fld>
             <a:endParaRPr lang="en-US"/>
           </a:p>
@@ -1964,7 +1965,7 @@
           <a:p>
             <a:fld id="{584E785A-4B92-4669-BA48-10B4A554473E}" type="datetimeFigureOut">
               <a:rPr lang="en-US" smtClean="0"/>
-              <a:t>8/7/2023</a:t>
+              <a:t>9/22/2023</a:t>
             </a:fld>
             <a:endParaRPr lang="en-US"/>
           </a:p>
@@ -2077,7 +2078,7 @@
           <a:p>
             <a:fld id="{584E785A-4B92-4669-BA48-10B4A554473E}" type="datetimeFigureOut">
               <a:rPr lang="en-US" smtClean="0"/>
-              <a:t>8/7/2023</a:t>
+              <a:t>9/22/2023</a:t>
             </a:fld>
             <a:endParaRPr lang="en-US"/>
           </a:p>
@@ -2388,7 +2389,7 @@
           <a:p>
             <a:fld id="{584E785A-4B92-4669-BA48-10B4A554473E}" type="datetimeFigureOut">
               <a:rPr lang="en-US" smtClean="0"/>
-              <a:t>8/7/2023</a:t>
+              <a:t>9/22/2023</a:t>
             </a:fld>
             <a:endParaRPr lang="en-US"/>
           </a:p>
@@ -2676,7 +2677,7 @@
           <a:p>
             <a:fld id="{584E785A-4B92-4669-BA48-10B4A554473E}" type="datetimeFigureOut">
               <a:rPr lang="en-US" smtClean="0"/>
-              <a:t>8/7/2023</a:t>
+              <a:t>9/22/2023</a:t>
             </a:fld>
             <a:endParaRPr lang="en-US"/>
           </a:p>
@@ -2917,7 +2918,7 @@
           <a:p>
             <a:fld id="{584E785A-4B92-4669-BA48-10B4A554473E}" type="datetimeFigureOut">
               <a:rPr lang="en-US" smtClean="0"/>
-              <a:t>8/7/2023</a:t>
+              <a:t>9/22/2023</a:t>
             </a:fld>
             <a:endParaRPr lang="en-US"/>
           </a:p>
@@ -3913,6 +3914,646 @@
     <p:extLst>
       <p:ext uri="{BB962C8B-B14F-4D97-AF65-F5344CB8AC3E}">
         <p14:creationId xmlns:p14="http://schemas.microsoft.com/office/powerpoint/2010/main" val="2116122172"/>
+      </p:ext>
+    </p:extLst>
+  </p:cSld>
+  <p:clrMapOvr>
+    <a:masterClrMapping/>
+  </p:clrMapOvr>
+</p:sld>
+</file>
+
+<file path=ppt/slides/slide10.xml><?xml version="1.0" encoding="utf-8"?>
+<p:sld xmlns:a="http://schemas.openxmlformats.org/drawingml/2006/main" xmlns:r="http://schemas.openxmlformats.org/officeDocument/2006/relationships" xmlns:p="http://schemas.openxmlformats.org/presentationml/2006/main">
+  <p:cSld>
+    <p:spTree>
+      <p:nvGrpSpPr>
+        <p:cNvPr id="1" name=""/>
+        <p:cNvGrpSpPr/>
+        <p:nvPr/>
+      </p:nvGrpSpPr>
+      <p:grpSpPr>
+        <a:xfrm>
+          <a:off x="0" y="0"/>
+          <a:ext cx="0" cy="0"/>
+          <a:chOff x="0" y="0"/>
+          <a:chExt cx="0" cy="0"/>
+        </a:xfrm>
+      </p:grpSpPr>
+      <p:sp>
+        <p:nvSpPr>
+          <p:cNvPr id="4" name="Rectangle: Rounded Corners 3">
+            <a:extLst>
+              <a:ext uri="{FF2B5EF4-FFF2-40B4-BE49-F238E27FC236}">
+                <a16:creationId xmlns:a16="http://schemas.microsoft.com/office/drawing/2014/main" id="{7E8FA8D8-2A0A-5D7D-7400-59970ADA0EC4}"/>
+              </a:ext>
+            </a:extLst>
+          </p:cNvPr>
+          <p:cNvSpPr/>
+          <p:nvPr/>
+        </p:nvSpPr>
+        <p:spPr>
+          <a:xfrm>
+            <a:off x="1664707" y="836995"/>
+            <a:ext cx="1924799" cy="1332273"/>
+          </a:xfrm>
+          <a:prstGeom prst="roundRect">
+            <a:avLst/>
+          </a:prstGeom>
+        </p:spPr>
+        <p:style>
+          <a:lnRef idx="2">
+            <a:schemeClr val="accent1">
+              <a:shade val="15000"/>
+            </a:schemeClr>
+          </a:lnRef>
+          <a:fillRef idx="1">
+            <a:schemeClr val="accent1"/>
+          </a:fillRef>
+          <a:effectRef idx="0">
+            <a:schemeClr val="accent1"/>
+          </a:effectRef>
+          <a:fontRef idx="minor">
+            <a:schemeClr val="lt1"/>
+          </a:fontRef>
+        </p:style>
+        <p:txBody>
+          <a:bodyPr rtlCol="0" anchor="ctr"/>
+          <a:lstStyle/>
+          <a:p>
+            <a:pPr algn="ctr"/>
+            <a:r>
+              <a:rPr lang="it-IT" dirty="0"/>
+              <a:t>single/multi sensor(EO/Microwave) satellite data</a:t>
+            </a:r>
+            <a:endParaRPr lang="en-US" dirty="0"/>
+          </a:p>
+        </p:txBody>
+      </p:sp>
+      <p:sp>
+        <p:nvSpPr>
+          <p:cNvPr id="5" name="Rectangle: Rounded Corners 4">
+            <a:extLst>
+              <a:ext uri="{FF2B5EF4-FFF2-40B4-BE49-F238E27FC236}">
+                <a16:creationId xmlns:a16="http://schemas.microsoft.com/office/drawing/2014/main" id="{95A36734-8C1E-7EBE-DA51-2A02DDCE5C55}"/>
+              </a:ext>
+            </a:extLst>
+          </p:cNvPr>
+          <p:cNvSpPr/>
+          <p:nvPr/>
+        </p:nvSpPr>
+        <p:spPr>
+          <a:xfrm>
+            <a:off x="4934779" y="629504"/>
+            <a:ext cx="1812645" cy="1086426"/>
+          </a:xfrm>
+          <a:prstGeom prst="roundRect">
+            <a:avLst/>
+          </a:prstGeom>
+        </p:spPr>
+        <p:style>
+          <a:lnRef idx="2">
+            <a:schemeClr val="accent1">
+              <a:shade val="15000"/>
+            </a:schemeClr>
+          </a:lnRef>
+          <a:fillRef idx="1">
+            <a:schemeClr val="accent1"/>
+          </a:fillRef>
+          <a:effectRef idx="0">
+            <a:schemeClr val="accent1"/>
+          </a:effectRef>
+          <a:fontRef idx="minor">
+            <a:schemeClr val="lt1"/>
+          </a:fontRef>
+        </p:style>
+        <p:txBody>
+          <a:bodyPr rtlCol="0" anchor="ctr"/>
+          <a:lstStyle/>
+          <a:p>
+            <a:pPr algn="ctr"/>
+            <a:r>
+              <a:rPr lang="en-US" dirty="0"/>
+              <a:t>WQA model</a:t>
+            </a:r>
+          </a:p>
+        </p:txBody>
+      </p:sp>
+      <p:sp>
+        <p:nvSpPr>
+          <p:cNvPr id="6" name="Rectangle: Rounded Corners 5">
+            <a:extLst>
+              <a:ext uri="{FF2B5EF4-FFF2-40B4-BE49-F238E27FC236}">
+                <a16:creationId xmlns:a16="http://schemas.microsoft.com/office/drawing/2014/main" id="{A1AEF9FB-0EF7-6311-A2DF-1941CE824F16}"/>
+              </a:ext>
+            </a:extLst>
+          </p:cNvPr>
+          <p:cNvSpPr/>
+          <p:nvPr/>
+        </p:nvSpPr>
+        <p:spPr>
+          <a:xfrm>
+            <a:off x="8367960" y="350612"/>
+            <a:ext cx="1750978" cy="972766"/>
+          </a:xfrm>
+          <a:prstGeom prst="roundRect">
+            <a:avLst/>
+          </a:prstGeom>
+        </p:spPr>
+        <p:style>
+          <a:lnRef idx="2">
+            <a:schemeClr val="accent1">
+              <a:shade val="15000"/>
+            </a:schemeClr>
+          </a:lnRef>
+          <a:fillRef idx="1">
+            <a:schemeClr val="accent1"/>
+          </a:fillRef>
+          <a:effectRef idx="0">
+            <a:schemeClr val="accent1"/>
+          </a:effectRef>
+          <a:fontRef idx="minor">
+            <a:schemeClr val="lt1"/>
+          </a:fontRef>
+        </p:style>
+        <p:txBody>
+          <a:bodyPr rtlCol="0" anchor="ctr"/>
+          <a:lstStyle/>
+          <a:p>
+            <a:pPr algn="ctr"/>
+            <a:r>
+              <a:rPr lang="en-US" dirty="0"/>
+              <a:t>Aquaculture body properties</a:t>
+            </a:r>
+          </a:p>
+        </p:txBody>
+      </p:sp>
+      <p:sp>
+        <p:nvSpPr>
+          <p:cNvPr id="7" name="Rectangle: Rounded Corners 6">
+            <a:extLst>
+              <a:ext uri="{FF2B5EF4-FFF2-40B4-BE49-F238E27FC236}">
+                <a16:creationId xmlns:a16="http://schemas.microsoft.com/office/drawing/2014/main" id="{22502B80-F8DD-7E4C-E94B-0D11B4DC99AB}"/>
+              </a:ext>
+            </a:extLst>
+          </p:cNvPr>
+          <p:cNvSpPr/>
+          <p:nvPr/>
+        </p:nvSpPr>
+        <p:spPr>
+          <a:xfrm>
+            <a:off x="7840850" y="4453249"/>
+            <a:ext cx="3511511" cy="1973430"/>
+          </a:xfrm>
+          <a:prstGeom prst="roundRect">
+            <a:avLst/>
+          </a:prstGeom>
+        </p:spPr>
+        <p:style>
+          <a:lnRef idx="2">
+            <a:schemeClr val="accent1">
+              <a:shade val="15000"/>
+            </a:schemeClr>
+          </a:lnRef>
+          <a:fillRef idx="1">
+            <a:schemeClr val="accent1"/>
+          </a:fillRef>
+          <a:effectRef idx="0">
+            <a:schemeClr val="accent1"/>
+          </a:effectRef>
+          <a:fontRef idx="minor">
+            <a:schemeClr val="lt1"/>
+          </a:fontRef>
+        </p:style>
+        <p:txBody>
+          <a:bodyPr rtlCol="0" anchor="ctr"/>
+          <a:lstStyle/>
+          <a:p>
+            <a:pPr algn="ctr"/>
+            <a:r>
+              <a:rPr lang="en-US" dirty="0"/>
+              <a:t>Predicted GT(</a:t>
+            </a:r>
+            <a:r>
+              <a:rPr lang="en-US" dirty="0" err="1"/>
+              <a:t>pH,Sal,Am</a:t>
+            </a:r>
+            <a:r>
+              <a:rPr lang="en-US" dirty="0"/>
+              <a:t>)</a:t>
+            </a:r>
+          </a:p>
+          <a:p>
+            <a:pPr algn="ctr"/>
+            <a:r>
+              <a:rPr lang="en-US" dirty="0"/>
+              <a:t>Based on Linear regression(atm)</a:t>
+            </a:r>
+          </a:p>
+          <a:p>
+            <a:pPr algn="ctr"/>
+            <a:endParaRPr lang="en-US" dirty="0"/>
+          </a:p>
+          <a:p>
+            <a:pPr algn="ctr"/>
+            <a:r>
+              <a:rPr lang="en-US" dirty="0"/>
+              <a:t>Can also do multivariate regression to get all set of parameters as a output </a:t>
+            </a:r>
+          </a:p>
+        </p:txBody>
+      </p:sp>
+      <p:sp>
+        <p:nvSpPr>
+          <p:cNvPr id="8" name="Rectangle: Rounded Corners 7">
+            <a:extLst>
+              <a:ext uri="{FF2B5EF4-FFF2-40B4-BE49-F238E27FC236}">
+                <a16:creationId xmlns:a16="http://schemas.microsoft.com/office/drawing/2014/main" id="{8B74622B-A59C-F06A-FD23-E5AC0DF488C1}"/>
+              </a:ext>
+            </a:extLst>
+          </p:cNvPr>
+          <p:cNvSpPr/>
+          <p:nvPr/>
+        </p:nvSpPr>
+        <p:spPr>
+          <a:xfrm>
+            <a:off x="2861197" y="3336900"/>
+            <a:ext cx="2979905" cy="1251878"/>
+          </a:xfrm>
+          <a:prstGeom prst="roundRect">
+            <a:avLst/>
+          </a:prstGeom>
+        </p:spPr>
+        <p:style>
+          <a:lnRef idx="2">
+            <a:schemeClr val="accent1">
+              <a:shade val="15000"/>
+            </a:schemeClr>
+          </a:lnRef>
+          <a:fillRef idx="1">
+            <a:schemeClr val="accent1"/>
+          </a:fillRef>
+          <a:effectRef idx="0">
+            <a:schemeClr val="accent1"/>
+          </a:effectRef>
+          <a:fontRef idx="minor">
+            <a:schemeClr val="lt1"/>
+          </a:fontRef>
+        </p:style>
+        <p:txBody>
+          <a:bodyPr rtlCol="0" anchor="ctr"/>
+          <a:lstStyle/>
+          <a:p>
+            <a:pPr algn="ctr"/>
+            <a:r>
+              <a:rPr lang="en-US" dirty="0"/>
+              <a:t>Predicted WQA parameters</a:t>
+            </a:r>
+          </a:p>
+        </p:txBody>
+      </p:sp>
+      <p:cxnSp>
+        <p:nvCxnSpPr>
+          <p:cNvPr id="11" name="Straight Arrow Connector 10">
+            <a:extLst>
+              <a:ext uri="{FF2B5EF4-FFF2-40B4-BE49-F238E27FC236}">
+                <a16:creationId xmlns:a16="http://schemas.microsoft.com/office/drawing/2014/main" id="{D2B4F0D2-2870-C63D-3090-FECAD0402176}"/>
+              </a:ext>
+            </a:extLst>
+          </p:cNvPr>
+          <p:cNvCxnSpPr>
+            <a:cxnSpLocks/>
+            <a:stCxn id="6" idx="1"/>
+            <a:endCxn id="5" idx="3"/>
+          </p:cNvCxnSpPr>
+          <p:nvPr/>
+        </p:nvCxnSpPr>
+        <p:spPr>
+          <a:xfrm flipH="1">
+            <a:off x="6747424" y="836995"/>
+            <a:ext cx="1620536" cy="335722"/>
+          </a:xfrm>
+          <a:prstGeom prst="straightConnector1">
+            <a:avLst/>
+          </a:prstGeom>
+          <a:ln>
+            <a:tailEnd type="triangle"/>
+          </a:ln>
+        </p:spPr>
+        <p:style>
+          <a:lnRef idx="1">
+            <a:schemeClr val="accent1"/>
+          </a:lnRef>
+          <a:fillRef idx="0">
+            <a:schemeClr val="accent1"/>
+          </a:fillRef>
+          <a:effectRef idx="0">
+            <a:schemeClr val="accent1"/>
+          </a:effectRef>
+          <a:fontRef idx="minor">
+            <a:schemeClr val="tx1"/>
+          </a:fontRef>
+        </p:style>
+      </p:cxnSp>
+      <p:cxnSp>
+        <p:nvCxnSpPr>
+          <p:cNvPr id="12" name="Straight Arrow Connector 11">
+            <a:extLst>
+              <a:ext uri="{FF2B5EF4-FFF2-40B4-BE49-F238E27FC236}">
+                <a16:creationId xmlns:a16="http://schemas.microsoft.com/office/drawing/2014/main" id="{C24F58EC-A0A2-EEDC-E49D-068A4F295860}"/>
+              </a:ext>
+            </a:extLst>
+          </p:cNvPr>
+          <p:cNvCxnSpPr>
+            <a:cxnSpLocks/>
+            <a:stCxn id="5" idx="2"/>
+            <a:endCxn id="8" idx="0"/>
+          </p:cNvCxnSpPr>
+          <p:nvPr/>
+        </p:nvCxnSpPr>
+        <p:spPr>
+          <a:xfrm flipH="1">
+            <a:off x="4351150" y="1715930"/>
+            <a:ext cx="1489952" cy="1620970"/>
+          </a:xfrm>
+          <a:prstGeom prst="straightConnector1">
+            <a:avLst/>
+          </a:prstGeom>
+          <a:ln>
+            <a:tailEnd type="triangle"/>
+          </a:ln>
+        </p:spPr>
+        <p:style>
+          <a:lnRef idx="1">
+            <a:schemeClr val="accent1"/>
+          </a:lnRef>
+          <a:fillRef idx="0">
+            <a:schemeClr val="accent1"/>
+          </a:fillRef>
+          <a:effectRef idx="0">
+            <a:schemeClr val="accent1"/>
+          </a:effectRef>
+          <a:fontRef idx="minor">
+            <a:schemeClr val="tx1"/>
+          </a:fontRef>
+        </p:style>
+      </p:cxnSp>
+      <p:cxnSp>
+        <p:nvCxnSpPr>
+          <p:cNvPr id="16" name="Straight Arrow Connector 15">
+            <a:extLst>
+              <a:ext uri="{FF2B5EF4-FFF2-40B4-BE49-F238E27FC236}">
+                <a16:creationId xmlns:a16="http://schemas.microsoft.com/office/drawing/2014/main" id="{5FEB787F-CAE0-9F44-D402-24327E58672E}"/>
+              </a:ext>
+            </a:extLst>
+          </p:cNvPr>
+          <p:cNvCxnSpPr>
+            <a:cxnSpLocks/>
+            <a:stCxn id="4" idx="2"/>
+            <a:endCxn id="8" idx="0"/>
+          </p:cNvCxnSpPr>
+          <p:nvPr/>
+        </p:nvCxnSpPr>
+        <p:spPr>
+          <a:xfrm>
+            <a:off x="2627107" y="2169268"/>
+            <a:ext cx="1724043" cy="1167632"/>
+          </a:xfrm>
+          <a:prstGeom prst="straightConnector1">
+            <a:avLst/>
+          </a:prstGeom>
+          <a:ln>
+            <a:tailEnd type="triangle"/>
+          </a:ln>
+        </p:spPr>
+        <p:style>
+          <a:lnRef idx="1">
+            <a:schemeClr val="accent1"/>
+          </a:lnRef>
+          <a:fillRef idx="0">
+            <a:schemeClr val="accent1"/>
+          </a:fillRef>
+          <a:effectRef idx="0">
+            <a:schemeClr val="accent1"/>
+          </a:effectRef>
+          <a:fontRef idx="minor">
+            <a:schemeClr val="tx1"/>
+          </a:fontRef>
+        </p:style>
+      </p:cxnSp>
+      <p:cxnSp>
+        <p:nvCxnSpPr>
+          <p:cNvPr id="19" name="Straight Arrow Connector 18">
+            <a:extLst>
+              <a:ext uri="{FF2B5EF4-FFF2-40B4-BE49-F238E27FC236}">
+                <a16:creationId xmlns:a16="http://schemas.microsoft.com/office/drawing/2014/main" id="{F7444D10-4355-E8AF-8105-F9B9FEFDF812}"/>
+              </a:ext>
+            </a:extLst>
+          </p:cNvPr>
+          <p:cNvCxnSpPr>
+            <a:cxnSpLocks/>
+            <a:stCxn id="8" idx="3"/>
+            <a:endCxn id="7" idx="1"/>
+          </p:cNvCxnSpPr>
+          <p:nvPr/>
+        </p:nvCxnSpPr>
+        <p:spPr>
+          <a:xfrm>
+            <a:off x="5841102" y="3962839"/>
+            <a:ext cx="1999748" cy="1477125"/>
+          </a:xfrm>
+          <a:prstGeom prst="straightConnector1">
+            <a:avLst/>
+          </a:prstGeom>
+          <a:ln>
+            <a:tailEnd type="triangle"/>
+          </a:ln>
+        </p:spPr>
+        <p:style>
+          <a:lnRef idx="1">
+            <a:schemeClr val="accent1"/>
+          </a:lnRef>
+          <a:fillRef idx="0">
+            <a:schemeClr val="accent1"/>
+          </a:fillRef>
+          <a:effectRef idx="0">
+            <a:schemeClr val="accent1"/>
+          </a:effectRef>
+          <a:fontRef idx="minor">
+            <a:schemeClr val="tx1"/>
+          </a:fontRef>
+        </p:style>
+      </p:cxnSp>
+      <p:pic>
+        <p:nvPicPr>
+          <p:cNvPr id="24" name="Picture 23" descr="A diagram of a function&#10;&#10;Description automatically generated">
+            <a:extLst>
+              <a:ext uri="{FF2B5EF4-FFF2-40B4-BE49-F238E27FC236}">
+                <a16:creationId xmlns:a16="http://schemas.microsoft.com/office/drawing/2014/main" id="{ABF95A03-BAB3-8619-BF4B-8FB05291B517}"/>
+              </a:ext>
+            </a:extLst>
+          </p:cNvPr>
+          <p:cNvPicPr>
+            <a:picLocks noChangeAspect="1"/>
+          </p:cNvPicPr>
+          <p:nvPr/>
+        </p:nvPicPr>
+        <p:blipFill>
+          <a:blip r:embed="rId2">
+            <a:extLst>
+              <a:ext uri="{28A0092B-C50C-407E-A947-70E740481C1C}">
+                <a14:useLocalDpi xmlns:a14="http://schemas.microsoft.com/office/drawing/2010/main" val="0"/>
+              </a:ext>
+            </a:extLst>
+          </a:blip>
+          <a:stretch>
+            <a:fillRect/>
+          </a:stretch>
+        </p:blipFill>
+        <p:spPr>
+          <a:xfrm>
+            <a:off x="6943779" y="1604285"/>
+            <a:ext cx="4844950" cy="2344732"/>
+          </a:xfrm>
+          <a:prstGeom prst="rect">
+            <a:avLst/>
+          </a:prstGeom>
+        </p:spPr>
+      </p:pic>
+      <p:sp>
+        <p:nvSpPr>
+          <p:cNvPr id="26" name="Arrow: Down 25">
+            <a:extLst>
+              <a:ext uri="{FF2B5EF4-FFF2-40B4-BE49-F238E27FC236}">
+                <a16:creationId xmlns:a16="http://schemas.microsoft.com/office/drawing/2014/main" id="{410EA7C3-3677-C6E8-3A86-8A199C5F97B0}"/>
+              </a:ext>
+            </a:extLst>
+          </p:cNvPr>
+          <p:cNvSpPr/>
+          <p:nvPr/>
+        </p:nvSpPr>
+        <p:spPr>
+          <a:xfrm rot="8574111">
+            <a:off x="7284781" y="1291772"/>
+            <a:ext cx="522115" cy="379563"/>
+          </a:xfrm>
+          <a:prstGeom prst="downArrow">
+            <a:avLst/>
+          </a:prstGeom>
+        </p:spPr>
+        <p:style>
+          <a:lnRef idx="2">
+            <a:schemeClr val="accent1">
+              <a:shade val="15000"/>
+            </a:schemeClr>
+          </a:lnRef>
+          <a:fillRef idx="1">
+            <a:schemeClr val="accent1"/>
+          </a:fillRef>
+          <a:effectRef idx="0">
+            <a:schemeClr val="accent1"/>
+          </a:effectRef>
+          <a:fontRef idx="minor">
+            <a:schemeClr val="lt1"/>
+          </a:fontRef>
+        </p:style>
+        <p:txBody>
+          <a:bodyPr rtlCol="0" anchor="ctr"/>
+          <a:lstStyle/>
+          <a:p>
+            <a:pPr algn="ctr"/>
+            <a:endParaRPr lang="en-US"/>
+          </a:p>
+        </p:txBody>
+      </p:sp>
+      <p:sp>
+        <p:nvSpPr>
+          <p:cNvPr id="2" name="TextBox 1">
+            <a:extLst>
+              <a:ext uri="{FF2B5EF4-FFF2-40B4-BE49-F238E27FC236}">
+                <a16:creationId xmlns:a16="http://schemas.microsoft.com/office/drawing/2014/main" id="{9EB25C17-9EAD-7FBC-1FF7-A83377A25012}"/>
+              </a:ext>
+            </a:extLst>
+          </p:cNvPr>
+          <p:cNvSpPr txBox="1"/>
+          <p:nvPr/>
+        </p:nvSpPr>
+        <p:spPr>
+          <a:xfrm>
+            <a:off x="388675" y="350612"/>
+            <a:ext cx="2174340" cy="369332"/>
+          </a:xfrm>
+          <a:prstGeom prst="rect">
+            <a:avLst/>
+          </a:prstGeom>
+          <a:noFill/>
+        </p:spPr>
+        <p:txBody>
+          <a:bodyPr wrap="square" rtlCol="0">
+            <a:spAutoFit/>
+          </a:bodyPr>
+          <a:lstStyle/>
+          <a:p>
+            <a:r>
+              <a:rPr lang="en-US" dirty="0"/>
+              <a:t>WQA Model</a:t>
+            </a:r>
+          </a:p>
+        </p:txBody>
+      </p:sp>
+      <p:sp>
+        <p:nvSpPr>
+          <p:cNvPr id="13" name="Rectangle: Rounded Corners 12">
+            <a:extLst>
+              <a:ext uri="{FF2B5EF4-FFF2-40B4-BE49-F238E27FC236}">
+                <a16:creationId xmlns:a16="http://schemas.microsoft.com/office/drawing/2014/main" id="{FDF83062-B565-AD86-0B92-E1D49DEDC09D}"/>
+              </a:ext>
+            </a:extLst>
+          </p:cNvPr>
+          <p:cNvSpPr/>
+          <p:nvPr/>
+        </p:nvSpPr>
+        <p:spPr>
+          <a:xfrm>
+            <a:off x="1569723" y="5420962"/>
+            <a:ext cx="2582948" cy="1086426"/>
+          </a:xfrm>
+          <a:prstGeom prst="roundRect">
+            <a:avLst/>
+          </a:prstGeom>
+        </p:spPr>
+        <p:style>
+          <a:lnRef idx="2">
+            <a:schemeClr val="accent1">
+              <a:shade val="15000"/>
+            </a:schemeClr>
+          </a:lnRef>
+          <a:fillRef idx="1">
+            <a:schemeClr val="accent1"/>
+          </a:fillRef>
+          <a:effectRef idx="0">
+            <a:schemeClr val="accent1"/>
+          </a:effectRef>
+          <a:fontRef idx="minor">
+            <a:schemeClr val="lt1"/>
+          </a:fontRef>
+        </p:style>
+        <p:txBody>
+          <a:bodyPr rtlCol="0" anchor="ctr"/>
+          <a:lstStyle/>
+          <a:p>
+            <a:pPr algn="ctr"/>
+            <a:r>
+              <a:rPr lang="en-US" dirty="0"/>
+              <a:t>Machine Learning model</a:t>
+            </a:r>
+          </a:p>
+        </p:txBody>
+      </p:sp>
+    </p:spTree>
+    <p:extLst>
+      <p:ext uri="{BB962C8B-B14F-4D97-AF65-F5344CB8AC3E}">
+        <p14:creationId xmlns:p14="http://schemas.microsoft.com/office/powerpoint/2010/main" val="3386925915"/>
       </p:ext>
     </p:extLst>
   </p:cSld>

</xml_diff>